<commit_message>
Committed on Thu 05/30/2019
</commit_message>
<xml_diff>
--- a/Báo-cáo-đồ-án-công-nghệ-phần-mềm.pptx
+++ b/Báo-cáo-đồ-án-công-nghệ-phần-mềm.pptx
@@ -4556,7 +4556,7 @@
           <a:p>
             <a:fld id="{77CBAB4F-F4D6-4FA6-95DD-E1D9C909A548}" type="datetimeFigureOut">
               <a:rPr lang="en-US" smtClean="0"/>
-              <a:t>5/26/2019</a:t>
+              <a:t>5/27/2019</a:t>
             </a:fld>
             <a:endParaRPr lang="en-US"/>
           </a:p>
@@ -4767,7 +4767,7 @@
           <a:p>
             <a:fld id="{48A87A34-81AB-432B-8DAE-1953F412C126}" type="datetimeFigureOut">
               <a:rPr lang="en-US" dirty="0"/>
-              <a:t>5/26/2019</a:t>
+              <a:t>5/27/2019</a:t>
             </a:fld>
             <a:endParaRPr lang="en-US" dirty="0"/>
           </a:p>
@@ -4982,7 +4982,7 @@
           <a:p>
             <a:fld id="{48A87A34-81AB-432B-8DAE-1953F412C126}" type="datetimeFigureOut">
               <a:rPr lang="en-US" dirty="0"/>
-              <a:t>5/26/2019</a:t>
+              <a:t>5/27/2019</a:t>
             </a:fld>
             <a:endParaRPr lang="en-US" dirty="0"/>
           </a:p>
@@ -5183,7 +5183,7 @@
           <a:p>
             <a:fld id="{48A87A34-81AB-432B-8DAE-1953F412C126}" type="datetimeFigureOut">
               <a:rPr lang="en-US" dirty="0"/>
-              <a:t>5/26/2019</a:t>
+              <a:t>5/27/2019</a:t>
             </a:fld>
             <a:endParaRPr lang="en-US" dirty="0"/>
           </a:p>
@@ -5462,7 +5462,7 @@
           <a:p>
             <a:fld id="{48A87A34-81AB-432B-8DAE-1953F412C126}" type="datetimeFigureOut">
               <a:rPr lang="en-US" dirty="0"/>
-              <a:t>5/26/2019</a:t>
+              <a:t>5/27/2019</a:t>
             </a:fld>
             <a:endParaRPr lang="en-US" dirty="0"/>
           </a:p>
@@ -5730,7 +5730,7 @@
           <a:p>
             <a:fld id="{48A87A34-81AB-432B-8DAE-1953F412C126}" type="datetimeFigureOut">
               <a:rPr lang="en-US" dirty="0"/>
-              <a:t>5/26/2019</a:t>
+              <a:t>5/27/2019</a:t>
             </a:fld>
             <a:endParaRPr lang="en-US" dirty="0"/>
           </a:p>
@@ -6146,7 +6146,7 @@
           <a:p>
             <a:fld id="{48A87A34-81AB-432B-8DAE-1953F412C126}" type="datetimeFigureOut">
               <a:rPr lang="en-US" dirty="0"/>
-              <a:t>5/26/2019</a:t>
+              <a:t>5/27/2019</a:t>
             </a:fld>
             <a:endParaRPr lang="en-US" dirty="0"/>
           </a:p>
@@ -6295,7 +6295,7 @@
           <a:p>
             <a:fld id="{48A87A34-81AB-432B-8DAE-1953F412C126}" type="datetimeFigureOut">
               <a:rPr lang="en-US" dirty="0"/>
-              <a:t>5/26/2019</a:t>
+              <a:t>5/27/2019</a:t>
             </a:fld>
             <a:endParaRPr lang="en-US" dirty="0"/>
           </a:p>
@@ -6421,7 +6421,7 @@
           <a:p>
             <a:fld id="{48A87A34-81AB-432B-8DAE-1953F412C126}" type="datetimeFigureOut">
               <a:rPr lang="en-US" dirty="0"/>
-              <a:t>5/26/2019</a:t>
+              <a:t>5/27/2019</a:t>
             </a:fld>
             <a:endParaRPr lang="en-US" dirty="0"/>
           </a:p>
@@ -6672,7 +6672,7 @@
           <a:p>
             <a:fld id="{48A87A34-81AB-432B-8DAE-1953F412C126}" type="datetimeFigureOut">
               <a:rPr lang="en-US" dirty="0"/>
-              <a:t>5/26/2019</a:t>
+              <a:t>5/27/2019</a:t>
             </a:fld>
             <a:endParaRPr lang="en-US" dirty="0"/>
           </a:p>
@@ -7118,7 +7118,7 @@
             <a:fld id="{48A87A34-81AB-432B-8DAE-1953F412C126}" type="datetimeFigureOut">
               <a:rPr lang="en-US" dirty="0"/>
               <a:pPr/>
-              <a:t>5/26/2019</a:t>
+              <a:t>5/27/2019</a:t>
             </a:fld>
             <a:endParaRPr lang="en-US" dirty="0"/>
           </a:p>
@@ -7446,7 +7446,7 @@
             <a:fld id="{48A87A34-81AB-432B-8DAE-1953F412C126}" type="datetimeFigureOut">
               <a:rPr lang="en-US" dirty="0"/>
               <a:pPr/>
-              <a:t>5/26/2019</a:t>
+              <a:t>5/27/2019</a:t>
             </a:fld>
             <a:endParaRPr lang="en-US" dirty="0"/>
           </a:p>
@@ -8235,8 +8235,8 @@
         </p:blipFill>
         <p:spPr>
           <a:xfrm>
-            <a:off x="463827" y="0"/>
-            <a:ext cx="1683026" cy="1683026"/>
+            <a:off x="145083" y="145450"/>
+            <a:ext cx="1299404" cy="1285784"/>
           </a:xfrm>
           <a:prstGeom prst="rect">
             <a:avLst/>
@@ -8300,8 +8300,8 @@
         </p:nvSpPr>
         <p:spPr>
           <a:xfrm>
-            <a:off x="1510747" y="4090297"/>
-            <a:ext cx="9647584" cy="1200329"/>
+            <a:off x="1641854" y="3932045"/>
+            <a:ext cx="9647584" cy="1938992"/>
           </a:xfrm>
           <a:prstGeom prst="rect">
             <a:avLst/>
@@ -8405,7 +8405,137 @@
                 <a:latin typeface="Times New Roman" panose="02020603050405020304" pitchFamily="18" charset="0"/>
                 <a:cs typeface="Times New Roman" panose="02020603050405020304" pitchFamily="18" charset="0"/>
               </a:rPr>
-              <a:t>: 15 </a:t>
+              <a:t> 15: </a:t>
+            </a:r>
+            <a:r>
+              <a:rPr lang="en-US" sz="2400" dirty="0" err="1">
+                <a:latin typeface="Times New Roman" panose="02020603050405020304" pitchFamily="18" charset="0"/>
+                <a:cs typeface="Times New Roman" panose="02020603050405020304" pitchFamily="18" charset="0"/>
+              </a:rPr>
+              <a:t>Trần</a:t>
+            </a:r>
+            <a:r>
+              <a:rPr lang="en-US" sz="2400" dirty="0">
+                <a:latin typeface="Times New Roman" panose="02020603050405020304" pitchFamily="18" charset="0"/>
+                <a:cs typeface="Times New Roman" panose="02020603050405020304" pitchFamily="18" charset="0"/>
+              </a:rPr>
+              <a:t> </a:t>
+            </a:r>
+            <a:r>
+              <a:rPr lang="en-US" sz="2400" dirty="0" err="1">
+                <a:latin typeface="Times New Roman" panose="02020603050405020304" pitchFamily="18" charset="0"/>
+                <a:cs typeface="Times New Roman" panose="02020603050405020304" pitchFamily="18" charset="0"/>
+              </a:rPr>
+              <a:t>Văn</a:t>
+            </a:r>
+            <a:r>
+              <a:rPr lang="en-US" sz="2400" dirty="0">
+                <a:latin typeface="Times New Roman" panose="02020603050405020304" pitchFamily="18" charset="0"/>
+                <a:cs typeface="Times New Roman" panose="02020603050405020304" pitchFamily="18" charset="0"/>
+              </a:rPr>
+              <a:t> Thanh- 55K2- 145D4802010076</a:t>
+            </a:r>
+          </a:p>
+          <a:p>
+            <a:r>
+              <a:rPr lang="en-US" sz="2400" dirty="0">
+                <a:latin typeface="Times New Roman" panose="02020603050405020304" pitchFamily="18" charset="0"/>
+                <a:cs typeface="Times New Roman" panose="02020603050405020304" pitchFamily="18" charset="0"/>
+              </a:rPr>
+              <a:t>                 </a:t>
+            </a:r>
+            <a:r>
+              <a:rPr lang="en-US" sz="2400" dirty="0" err="1">
+                <a:latin typeface="Times New Roman" panose="02020603050405020304" pitchFamily="18" charset="0"/>
+                <a:cs typeface="Times New Roman" panose="02020603050405020304" pitchFamily="18" charset="0"/>
+              </a:rPr>
+              <a:t>Ngô</a:t>
+            </a:r>
+            <a:r>
+              <a:rPr lang="en-US" sz="2400" dirty="0">
+                <a:latin typeface="Times New Roman" panose="02020603050405020304" pitchFamily="18" charset="0"/>
+                <a:cs typeface="Times New Roman" panose="02020603050405020304" pitchFamily="18" charset="0"/>
+              </a:rPr>
+              <a:t> </a:t>
+            </a:r>
+            <a:r>
+              <a:rPr lang="en-US" sz="2400" dirty="0" err="1">
+                <a:latin typeface="Times New Roman" panose="02020603050405020304" pitchFamily="18" charset="0"/>
+                <a:cs typeface="Times New Roman" panose="02020603050405020304" pitchFamily="18" charset="0"/>
+              </a:rPr>
+              <a:t>Đức</a:t>
+            </a:r>
+            <a:r>
+              <a:rPr lang="en-US" sz="2400" dirty="0">
+                <a:latin typeface="Times New Roman" panose="02020603050405020304" pitchFamily="18" charset="0"/>
+                <a:cs typeface="Times New Roman" panose="02020603050405020304" pitchFamily="18" charset="0"/>
+              </a:rPr>
+              <a:t> </a:t>
+            </a:r>
+            <a:r>
+              <a:rPr lang="en-US" sz="2400" dirty="0" err="1">
+                <a:latin typeface="Times New Roman" panose="02020603050405020304" pitchFamily="18" charset="0"/>
+                <a:cs typeface="Times New Roman" panose="02020603050405020304" pitchFamily="18" charset="0"/>
+              </a:rPr>
+              <a:t>Thế</a:t>
+            </a:r>
+            <a:r>
+              <a:rPr lang="en-US" sz="2400" dirty="0">
+                <a:latin typeface="Times New Roman" panose="02020603050405020304" pitchFamily="18" charset="0"/>
+                <a:cs typeface="Times New Roman" panose="02020603050405020304" pitchFamily="18" charset="0"/>
+              </a:rPr>
+              <a:t>- 55K2- 145D4802010049</a:t>
+            </a:r>
+          </a:p>
+          <a:p>
+            <a:r>
+              <a:rPr lang="en-US" sz="2400" dirty="0">
+                <a:latin typeface="Times New Roman" panose="02020603050405020304" pitchFamily="18" charset="0"/>
+                <a:cs typeface="Times New Roman" panose="02020603050405020304" pitchFamily="18" charset="0"/>
+              </a:rPr>
+              <a:t>                 </a:t>
+            </a:r>
+            <a:r>
+              <a:rPr lang="en-US" sz="2400" dirty="0" err="1">
+                <a:latin typeface="Times New Roman" panose="02020603050405020304" pitchFamily="18" charset="0"/>
+                <a:cs typeface="Times New Roman" panose="02020603050405020304" pitchFamily="18" charset="0"/>
+              </a:rPr>
+              <a:t>Trần</a:t>
+            </a:r>
+            <a:r>
+              <a:rPr lang="en-US" sz="2400" dirty="0">
+                <a:latin typeface="Times New Roman" panose="02020603050405020304" pitchFamily="18" charset="0"/>
+                <a:cs typeface="Times New Roman" panose="02020603050405020304" pitchFamily="18" charset="0"/>
+              </a:rPr>
+              <a:t> </a:t>
+            </a:r>
+            <a:r>
+              <a:rPr lang="en-US" sz="2400" dirty="0" err="1">
+                <a:latin typeface="Times New Roman" panose="02020603050405020304" pitchFamily="18" charset="0"/>
+                <a:cs typeface="Times New Roman" panose="02020603050405020304" pitchFamily="18" charset="0"/>
+              </a:rPr>
+              <a:t>Bá</a:t>
+            </a:r>
+            <a:r>
+              <a:rPr lang="en-US" sz="2400" dirty="0">
+                <a:latin typeface="Times New Roman" panose="02020603050405020304" pitchFamily="18" charset="0"/>
+                <a:cs typeface="Times New Roman" panose="02020603050405020304" pitchFamily="18" charset="0"/>
+              </a:rPr>
+              <a:t> </a:t>
+            </a:r>
+            <a:r>
+              <a:rPr lang="en-US" sz="2400" dirty="0" err="1">
+                <a:latin typeface="Times New Roman" panose="02020603050405020304" pitchFamily="18" charset="0"/>
+                <a:cs typeface="Times New Roman" panose="02020603050405020304" pitchFamily="18" charset="0"/>
+              </a:rPr>
+              <a:t>Thắng</a:t>
+            </a:r>
+            <a:r>
+              <a:rPr lang="en-US" sz="2400" dirty="0">
+                <a:latin typeface="Times New Roman" panose="02020603050405020304" pitchFamily="18" charset="0"/>
+                <a:cs typeface="Times New Roman" panose="02020603050405020304" pitchFamily="18" charset="0"/>
+              </a:rPr>
+              <a:t>- 55K2- 145D4802010052</a:t>
             </a:r>
           </a:p>
           <a:p>
@@ -8963,7 +9093,7 @@
                 <a:latin typeface="Times New Roman" panose="02020603050405020304" pitchFamily="18" charset="0"/>
                 <a:cs typeface="Times New Roman" panose="02020603050405020304" pitchFamily="18" charset="0"/>
               </a:rPr>
-              <a:t>tiêu</a:t>
+              <a:t>sử</a:t>
             </a:r>
             <a:r>
               <a:rPr lang="en-US" sz="2400" dirty="0">
@@ -8977,7 +9107,7 @@
                 <a:latin typeface="Times New Roman" panose="02020603050405020304" pitchFamily="18" charset="0"/>
                 <a:cs typeface="Times New Roman" panose="02020603050405020304" pitchFamily="18" charset="0"/>
               </a:rPr>
-              <a:t>dùng</a:t>
+              <a:t>dụng</a:t>
             </a:r>
             <a:r>
               <a:rPr lang="en-US" sz="2400" dirty="0">
@@ -10085,14 +10215,74 @@
               <a:defRPr/>
             </a:pPr>
             <a:r>
-              <a:rPr lang="en-US" kern="0" noProof="0">
+              <a:rPr lang="en-US" kern="0" noProof="0" dirty="0" err="1">
                 <a:solidFill>
                   <a:prstClr val="black"/>
                 </a:solidFill>
                 <a:latin typeface="Times New Roman" panose="02020603050405020304" pitchFamily="18" charset="0"/>
                 <a:cs typeface="Times New Roman" panose="02020603050405020304" pitchFamily="18" charset="0"/>
               </a:rPr>
-              <a:t>Phân tích thiết kế</a:t>
+              <a:t>Phân</a:t>
+            </a:r>
+            <a:r>
+              <a:rPr lang="en-US" kern="0" noProof="0" dirty="0">
+                <a:solidFill>
+                  <a:prstClr val="black"/>
+                </a:solidFill>
+                <a:latin typeface="Times New Roman" panose="02020603050405020304" pitchFamily="18" charset="0"/>
+                <a:cs typeface="Times New Roman" panose="02020603050405020304" pitchFamily="18" charset="0"/>
+              </a:rPr>
+              <a:t> </a:t>
+            </a:r>
+            <a:r>
+              <a:rPr lang="en-US" kern="0" noProof="0" dirty="0" err="1">
+                <a:solidFill>
+                  <a:prstClr val="black"/>
+                </a:solidFill>
+                <a:latin typeface="Times New Roman" panose="02020603050405020304" pitchFamily="18" charset="0"/>
+                <a:cs typeface="Times New Roman" panose="02020603050405020304" pitchFamily="18" charset="0"/>
+              </a:rPr>
+              <a:t>tích</a:t>
+            </a:r>
+            <a:r>
+              <a:rPr lang="en-US" kern="0" noProof="0" dirty="0">
+                <a:solidFill>
+                  <a:prstClr val="black"/>
+                </a:solidFill>
+                <a:latin typeface="Times New Roman" panose="02020603050405020304" pitchFamily="18" charset="0"/>
+                <a:cs typeface="Times New Roman" panose="02020603050405020304" pitchFamily="18" charset="0"/>
+              </a:rPr>
+              <a:t> </a:t>
+            </a:r>
+            <a:r>
+              <a:rPr lang="en-US" kern="0" noProof="0" dirty="0" err="1">
+                <a:solidFill>
+                  <a:prstClr val="black"/>
+                </a:solidFill>
+                <a:latin typeface="Times New Roman" panose="02020603050405020304" pitchFamily="18" charset="0"/>
+                <a:cs typeface="Times New Roman" panose="02020603050405020304" pitchFamily="18" charset="0"/>
+              </a:rPr>
+              <a:t>thiết</a:t>
+            </a:r>
+            <a:r>
+              <a:rPr lang="en-US" kern="0" noProof="0" dirty="0">
+                <a:solidFill>
+                  <a:prstClr val="black"/>
+                </a:solidFill>
+                <a:latin typeface="Times New Roman" panose="02020603050405020304" pitchFamily="18" charset="0"/>
+                <a:cs typeface="Times New Roman" panose="02020603050405020304" pitchFamily="18" charset="0"/>
+              </a:rPr>
+              <a:t> </a:t>
+            </a:r>
+            <a:r>
+              <a:rPr lang="en-US" kern="0" noProof="0" dirty="0" err="1">
+                <a:solidFill>
+                  <a:prstClr val="black"/>
+                </a:solidFill>
+                <a:latin typeface="Times New Roman" panose="02020603050405020304" pitchFamily="18" charset="0"/>
+                <a:cs typeface="Times New Roman" panose="02020603050405020304" pitchFamily="18" charset="0"/>
+              </a:rPr>
+              <a:t>kế</a:t>
             </a:r>
             <a:endParaRPr kumimoji="0" lang="en-US" sz="1800" b="0" i="0" u="none" strike="noStrike" kern="0" cap="none" spc="0" normalizeH="0" baseline="0" noProof="0" dirty="0">
               <a:ln>
@@ -11173,14 +11363,34 @@
               <a:defRPr/>
             </a:pPr>
             <a:r>
-              <a:rPr lang="en-US" kern="0" noProof="0">
+              <a:rPr lang="en-US" kern="0" noProof="0" dirty="0">
                 <a:solidFill>
                   <a:prstClr val="black"/>
                 </a:solidFill>
                 <a:latin typeface="Times New Roman" panose="02020603050405020304" pitchFamily="18" charset="0"/>
                 <a:cs typeface="Times New Roman" panose="02020603050405020304" pitchFamily="18" charset="0"/>
               </a:rPr>
-              <a:t>Coding(csdl)	</a:t>
+              <a:t>Coding(</a:t>
+            </a:r>
+            <a:r>
+              <a:rPr lang="en-US" kern="0" noProof="0" dirty="0" err="1">
+                <a:solidFill>
+                  <a:prstClr val="black"/>
+                </a:solidFill>
+                <a:latin typeface="Times New Roman" panose="02020603050405020304" pitchFamily="18" charset="0"/>
+                <a:cs typeface="Times New Roman" panose="02020603050405020304" pitchFamily="18" charset="0"/>
+              </a:rPr>
+              <a:t>csdl</a:t>
+            </a:r>
+            <a:r>
+              <a:rPr lang="en-US" kern="0" noProof="0" dirty="0">
+                <a:solidFill>
+                  <a:prstClr val="black"/>
+                </a:solidFill>
+                <a:latin typeface="Times New Roman" panose="02020603050405020304" pitchFamily="18" charset="0"/>
+                <a:cs typeface="Times New Roman" panose="02020603050405020304" pitchFamily="18" charset="0"/>
+              </a:rPr>
+              <a:t>)	</a:t>
             </a:r>
             <a:endParaRPr kumimoji="0" lang="en-US" sz="1800" b="0" i="0" u="none" strike="noStrike" kern="0" cap="none" spc="0" normalizeH="0" baseline="0" noProof="0" dirty="0">
               <a:ln>
@@ -11869,7 +12079,7 @@
               <a:defRPr/>
             </a:pPr>
             <a:r>
-              <a:rPr kumimoji="0" lang="en-US" sz="1800" b="0" i="0" u="none" strike="noStrike" kern="0" cap="none" spc="0" normalizeH="0" baseline="0" noProof="0">
+              <a:rPr kumimoji="0" lang="en-US" sz="1800" b="0" i="0" u="none" strike="noStrike" kern="0" cap="none" spc="0" normalizeH="0" baseline="0" noProof="0" dirty="0">
                 <a:ln>
                   <a:noFill/>
                 </a:ln>
@@ -11882,10 +12092,10 @@
                 <a:latin typeface="Times New Roman" panose="02020603050405020304" pitchFamily="18" charset="0"/>
                 <a:cs typeface="Times New Roman" panose="02020603050405020304" pitchFamily="18" charset="0"/>
               </a:rPr>
-              <a:t>Thu thập</a:t>
-            </a:r>
-            <a:r>
-              <a:rPr kumimoji="0" lang="en-US" sz="1800" b="0" i="0" u="none" strike="noStrike" kern="0" cap="none" spc="0" normalizeH="0" noProof="0">
+              <a:t>Thu </a:t>
+            </a:r>
+            <a:r>
+              <a:rPr kumimoji="0" lang="en-US" sz="1800" b="0" i="0" u="none" strike="noStrike" kern="0" cap="none" spc="0" normalizeH="0" baseline="0" noProof="0" dirty="0" err="1">
                 <a:ln>
                   <a:noFill/>
                 </a:ln>
@@ -11898,7 +12108,71 @@
                 <a:latin typeface="Times New Roman" panose="02020603050405020304" pitchFamily="18" charset="0"/>
                 <a:cs typeface="Times New Roman" panose="02020603050405020304" pitchFamily="18" charset="0"/>
               </a:rPr>
-              <a:t> yêu cầu</a:t>
+              <a:t>thập</a:t>
+            </a:r>
+            <a:r>
+              <a:rPr kumimoji="0" lang="en-US" sz="1800" b="0" i="0" u="none" strike="noStrike" kern="0" cap="none" spc="0" normalizeH="0" noProof="0" dirty="0">
+                <a:ln>
+                  <a:noFill/>
+                </a:ln>
+                <a:solidFill>
+                  <a:prstClr val="black"/>
+                </a:solidFill>
+                <a:effectLst/>
+                <a:uLnTx/>
+                <a:uFillTx/>
+                <a:latin typeface="Times New Roman" panose="02020603050405020304" pitchFamily="18" charset="0"/>
+                <a:cs typeface="Times New Roman" panose="02020603050405020304" pitchFamily="18" charset="0"/>
+              </a:rPr>
+              <a:t> </a:t>
+            </a:r>
+            <a:r>
+              <a:rPr kumimoji="0" lang="en-US" sz="1800" b="0" i="0" u="none" strike="noStrike" kern="0" cap="none" spc="0" normalizeH="0" noProof="0" dirty="0" err="1">
+                <a:ln>
+                  <a:noFill/>
+                </a:ln>
+                <a:solidFill>
+                  <a:prstClr val="black"/>
+                </a:solidFill>
+                <a:effectLst/>
+                <a:uLnTx/>
+                <a:uFillTx/>
+                <a:latin typeface="Times New Roman" panose="02020603050405020304" pitchFamily="18" charset="0"/>
+                <a:cs typeface="Times New Roman" panose="02020603050405020304" pitchFamily="18" charset="0"/>
+              </a:rPr>
+              <a:t>yêu</a:t>
+            </a:r>
+            <a:r>
+              <a:rPr kumimoji="0" lang="en-US" sz="1800" b="0" i="0" u="none" strike="noStrike" kern="0" cap="none" spc="0" normalizeH="0" noProof="0" dirty="0">
+                <a:ln>
+                  <a:noFill/>
+                </a:ln>
+                <a:solidFill>
+                  <a:prstClr val="black"/>
+                </a:solidFill>
+                <a:effectLst/>
+                <a:uLnTx/>
+                <a:uFillTx/>
+                <a:latin typeface="Times New Roman" panose="02020603050405020304" pitchFamily="18" charset="0"/>
+                <a:cs typeface="Times New Roman" panose="02020603050405020304" pitchFamily="18" charset="0"/>
+              </a:rPr>
+              <a:t> </a:t>
+            </a:r>
+            <a:r>
+              <a:rPr kumimoji="0" lang="en-US" sz="1800" b="0" i="0" u="none" strike="noStrike" kern="0" cap="none" spc="0" normalizeH="0" noProof="0" dirty="0" err="1">
+                <a:ln>
+                  <a:noFill/>
+                </a:ln>
+                <a:solidFill>
+                  <a:prstClr val="black"/>
+                </a:solidFill>
+                <a:effectLst/>
+                <a:uLnTx/>
+                <a:uFillTx/>
+                <a:latin typeface="Times New Roman" panose="02020603050405020304" pitchFamily="18" charset="0"/>
+                <a:cs typeface="Times New Roman" panose="02020603050405020304" pitchFamily="18" charset="0"/>
+              </a:rPr>
+              <a:t>cầu</a:t>
             </a:r>
             <a:endParaRPr kumimoji="0" lang="en-US" sz="1800" b="0" i="0" u="none" strike="noStrike" kern="0" cap="none" spc="0" normalizeH="0" baseline="0" noProof="0" dirty="0">
               <a:ln>
@@ -11981,7 +12255,7 @@
               <a:defRPr/>
             </a:pPr>
             <a:r>
-              <a:rPr lang="en-US" kern="0">
+              <a:rPr lang="en-US" kern="0" dirty="0">
                 <a:solidFill>
                   <a:prstClr val="black"/>
                 </a:solidFill>

</xml_diff>

<commit_message>
Commit on Mon 06/17/2019
</commit_message>
<xml_diff>
--- a/Báo-cáo-đồ-án-công-nghệ-phần-mềm.pptx
+++ b/Báo-cáo-đồ-án-công-nghệ-phần-mềm.pptx
@@ -1942,6 +1942,13 @@
         </dgm:presLayoutVars>
       </dgm:prSet>
       <dgm:spPr/>
+      <dgm:t>
+        <a:bodyPr/>
+        <a:lstStyle/>
+        <a:p>
+          <a:endParaRPr lang="en-US"/>
+        </a:p>
+      </dgm:t>
     </dgm:pt>
     <dgm:pt modelId="{A31C931D-059C-4B98-ADE6-52B7DD323B90}" type="pres">
       <dgm:prSet presAssocID="{A07F40D5-0284-4621-8B57-7F5F0BD6D33C}" presName="parentText" presStyleLbl="node1" presStyleIdx="0" presStyleCnt="3">
@@ -1951,6 +1958,13 @@
         </dgm:presLayoutVars>
       </dgm:prSet>
       <dgm:spPr/>
+      <dgm:t>
+        <a:bodyPr/>
+        <a:lstStyle/>
+        <a:p>
+          <a:endParaRPr lang="en-US"/>
+        </a:p>
+      </dgm:t>
     </dgm:pt>
     <dgm:pt modelId="{9BA3B302-3B14-4374-BB4F-89D621F9F673}" type="pres">
       <dgm:prSet presAssocID="{7E49012C-E121-42B3-B939-C261A6153D87}" presName="spacer" presStyleCnt="0"/>
@@ -1964,6 +1978,13 @@
         </dgm:presLayoutVars>
       </dgm:prSet>
       <dgm:spPr/>
+      <dgm:t>
+        <a:bodyPr/>
+        <a:lstStyle/>
+        <a:p>
+          <a:endParaRPr lang="en-US"/>
+        </a:p>
+      </dgm:t>
     </dgm:pt>
     <dgm:pt modelId="{0F493DB8-05D9-485C-AA87-402D60FB2C44}" type="pres">
       <dgm:prSet presAssocID="{388EEFD7-F887-4759-BB93-3F4D366BE7AD}" presName="spacer" presStyleCnt="0"/>
@@ -1977,16 +1998,23 @@
         </dgm:presLayoutVars>
       </dgm:prSet>
       <dgm:spPr/>
+      <dgm:t>
+        <a:bodyPr/>
+        <a:lstStyle/>
+        <a:p>
+          <a:endParaRPr lang="en-US"/>
+        </a:p>
+      </dgm:t>
     </dgm:pt>
   </dgm:ptLst>
   <dgm:cxnLst>
-    <dgm:cxn modelId="{9B6A2606-84E9-40EF-95C8-7935E20AC616}" srcId="{8E56F68B-9079-454D-BE57-F1FD17174858}" destId="{D3519ACC-790E-420E-8B19-0F983F5B940E}" srcOrd="2" destOrd="0" parTransId="{77B5DF0B-E5CE-4E6D-93DB-82FF3E3C898C}" sibTransId="{76922B62-362F-473F-9A44-DA9C49F7EDD7}"/>
     <dgm:cxn modelId="{EBA8D709-7193-4476-9848-CD1B1039B1B1}" type="presOf" srcId="{8E56F68B-9079-454D-BE57-F1FD17174858}" destId="{77FCA6CD-3737-47B8-9D03-A00C1EA4CC25}" srcOrd="0" destOrd="0" presId="urn:microsoft.com/office/officeart/2005/8/layout/vList2"/>
-    <dgm:cxn modelId="{90B3BB48-F810-4ABC-8848-F8DC742C4612}" srcId="{8E56F68B-9079-454D-BE57-F1FD17174858}" destId="{D2148DEF-26F1-4766-BA4E-EA2AEB77EE11}" srcOrd="1" destOrd="0" parTransId="{3B06BD7A-0E33-43D0-ACDE-CA6933AA9BBD}" sibTransId="{388EEFD7-F887-4759-BB93-3F4D366BE7AD}"/>
+    <dgm:cxn modelId="{E7F165C2-F012-4939-8976-47DF17633E8B}" type="presOf" srcId="{A07F40D5-0284-4621-8B57-7F5F0BD6D33C}" destId="{A31C931D-059C-4B98-ADE6-52B7DD323B90}" srcOrd="0" destOrd="0" presId="urn:microsoft.com/office/officeart/2005/8/layout/vList2"/>
+    <dgm:cxn modelId="{33C646DE-3AB7-469B-8899-EA02AEAD04DD}" type="presOf" srcId="{D2148DEF-26F1-4766-BA4E-EA2AEB77EE11}" destId="{6DC787F9-B82C-4E6F-BAFE-0771F56719B8}" srcOrd="0" destOrd="0" presId="urn:microsoft.com/office/officeart/2005/8/layout/vList2"/>
     <dgm:cxn modelId="{85E6976B-2694-414C-B0FA-B9484252122D}" srcId="{8E56F68B-9079-454D-BE57-F1FD17174858}" destId="{A07F40D5-0284-4621-8B57-7F5F0BD6D33C}" srcOrd="0" destOrd="0" parTransId="{A92BCE36-1200-45B6-8818-C166846F7A4B}" sibTransId="{7E49012C-E121-42B3-B939-C261A6153D87}"/>
     <dgm:cxn modelId="{7E967E9B-A36E-40F4-9BB4-94001D6C69D3}" type="presOf" srcId="{D3519ACC-790E-420E-8B19-0F983F5B940E}" destId="{FDBDBA60-C727-4B74-A406-FC85D24C0CAF}" srcOrd="0" destOrd="0" presId="urn:microsoft.com/office/officeart/2005/8/layout/vList2"/>
-    <dgm:cxn modelId="{E7F165C2-F012-4939-8976-47DF17633E8B}" type="presOf" srcId="{A07F40D5-0284-4621-8B57-7F5F0BD6D33C}" destId="{A31C931D-059C-4B98-ADE6-52B7DD323B90}" srcOrd="0" destOrd="0" presId="urn:microsoft.com/office/officeart/2005/8/layout/vList2"/>
-    <dgm:cxn modelId="{33C646DE-3AB7-469B-8899-EA02AEAD04DD}" type="presOf" srcId="{D2148DEF-26F1-4766-BA4E-EA2AEB77EE11}" destId="{6DC787F9-B82C-4E6F-BAFE-0771F56719B8}" srcOrd="0" destOrd="0" presId="urn:microsoft.com/office/officeart/2005/8/layout/vList2"/>
+    <dgm:cxn modelId="{90B3BB48-F810-4ABC-8848-F8DC742C4612}" srcId="{8E56F68B-9079-454D-BE57-F1FD17174858}" destId="{D2148DEF-26F1-4766-BA4E-EA2AEB77EE11}" srcOrd="1" destOrd="0" parTransId="{3B06BD7A-0E33-43D0-ACDE-CA6933AA9BBD}" sibTransId="{388EEFD7-F887-4759-BB93-3F4D366BE7AD}"/>
+    <dgm:cxn modelId="{9B6A2606-84E9-40EF-95C8-7935E20AC616}" srcId="{8E56F68B-9079-454D-BE57-F1FD17174858}" destId="{D3519ACC-790E-420E-8B19-0F983F5B940E}" srcOrd="2" destOrd="0" parTransId="{77B5DF0B-E5CE-4E6D-93DB-82FF3E3C898C}" sibTransId="{76922B62-362F-473F-9A44-DA9C49F7EDD7}"/>
     <dgm:cxn modelId="{D759F61A-0F41-4B6D-87EC-C4B89AFB4360}" type="presParOf" srcId="{77FCA6CD-3737-47B8-9D03-A00C1EA4CC25}" destId="{A31C931D-059C-4B98-ADE6-52B7DD323B90}" srcOrd="0" destOrd="0" presId="urn:microsoft.com/office/officeart/2005/8/layout/vList2"/>
     <dgm:cxn modelId="{D658C353-948D-4252-AE01-53172C8976ED}" type="presParOf" srcId="{77FCA6CD-3737-47B8-9D03-A00C1EA4CC25}" destId="{9BA3B302-3B14-4374-BB4F-89D621F9F673}" srcOrd="1" destOrd="0" presId="urn:microsoft.com/office/officeart/2005/8/layout/vList2"/>
     <dgm:cxn modelId="{F676DDD3-78A8-42B3-9139-1310CB68476F}" type="presParOf" srcId="{77FCA6CD-3737-47B8-9D03-A00C1EA4CC25}" destId="{6DC787F9-B82C-4E6F-BAFE-0771F56719B8}" srcOrd="2" destOrd="0" presId="urn:microsoft.com/office/officeart/2005/8/layout/vList2"/>
@@ -2085,7 +2113,7 @@
         </a:bodyPr>
         <a:lstStyle/>
         <a:p>
-          <a:pPr marL="0" lvl="0" indent="0" algn="l" defTabSz="1066800">
+          <a:pPr lvl="0" algn="l" defTabSz="1066800">
             <a:lnSpc>
               <a:spcPct val="90000"/>
             </a:lnSpc>
@@ -2095,7 +2123,6 @@
             <a:spcAft>
               <a:spcPct val="35000"/>
             </a:spcAft>
-            <a:buNone/>
           </a:pPr>
           <a:r>
             <a:rPr lang="en-US" sz="2400" kern="1200" dirty="0" err="1">
@@ -2332,7 +2359,7 @@
         </a:bodyPr>
         <a:lstStyle/>
         <a:p>
-          <a:pPr marL="0" lvl="0" indent="0" algn="l" defTabSz="1066800">
+          <a:pPr lvl="0" algn="l" defTabSz="1066800">
             <a:lnSpc>
               <a:spcPct val="90000"/>
             </a:lnSpc>
@@ -2342,7 +2369,6 @@
             <a:spcAft>
               <a:spcPct val="35000"/>
             </a:spcAft>
-            <a:buNone/>
           </a:pPr>
           <a:r>
             <a:rPr lang="en-US" sz="2400" kern="1200" dirty="0" err="1">
@@ -2831,7 +2857,7 @@
         </a:bodyPr>
         <a:lstStyle/>
         <a:p>
-          <a:pPr marL="0" lvl="0" indent="0" algn="l" defTabSz="1066800">
+          <a:pPr lvl="0" algn="l" defTabSz="1066800">
             <a:lnSpc>
               <a:spcPct val="90000"/>
             </a:lnSpc>
@@ -2841,7 +2867,6 @@
             <a:spcAft>
               <a:spcPct val="35000"/>
             </a:spcAft>
-            <a:buNone/>
           </a:pPr>
           <a:r>
             <a:rPr lang="en-US" sz="2400" kern="1200" dirty="0" err="1">
@@ -4556,7 +4581,7 @@
           <a:p>
             <a:fld id="{77CBAB4F-F4D6-4FA6-95DD-E1D9C909A548}" type="datetimeFigureOut">
               <a:rPr lang="en-US" smtClean="0"/>
-              <a:t>5/27/2019</a:t>
+              <a:t>17/6/2019</a:t>
             </a:fld>
             <a:endParaRPr lang="en-US"/>
           </a:p>
@@ -4767,7 +4792,7 @@
           <a:p>
             <a:fld id="{48A87A34-81AB-432B-8DAE-1953F412C126}" type="datetimeFigureOut">
               <a:rPr lang="en-US" dirty="0"/>
-              <a:t>5/27/2019</a:t>
+              <a:t>17/6/2019</a:t>
             </a:fld>
             <a:endParaRPr lang="en-US" dirty="0"/>
           </a:p>
@@ -4982,7 +5007,7 @@
           <a:p>
             <a:fld id="{48A87A34-81AB-432B-8DAE-1953F412C126}" type="datetimeFigureOut">
               <a:rPr lang="en-US" dirty="0"/>
-              <a:t>5/27/2019</a:t>
+              <a:t>17/6/2019</a:t>
             </a:fld>
             <a:endParaRPr lang="en-US" dirty="0"/>
           </a:p>
@@ -5183,7 +5208,7 @@
           <a:p>
             <a:fld id="{48A87A34-81AB-432B-8DAE-1953F412C126}" type="datetimeFigureOut">
               <a:rPr lang="en-US" dirty="0"/>
-              <a:t>5/27/2019</a:t>
+              <a:t>17/6/2019</a:t>
             </a:fld>
             <a:endParaRPr lang="en-US" dirty="0"/>
           </a:p>
@@ -5462,7 +5487,7 @@
           <a:p>
             <a:fld id="{48A87A34-81AB-432B-8DAE-1953F412C126}" type="datetimeFigureOut">
               <a:rPr lang="en-US" dirty="0"/>
-              <a:t>5/27/2019</a:t>
+              <a:t>17/6/2019</a:t>
             </a:fld>
             <a:endParaRPr lang="en-US" dirty="0"/>
           </a:p>
@@ -5730,7 +5755,7 @@
           <a:p>
             <a:fld id="{48A87A34-81AB-432B-8DAE-1953F412C126}" type="datetimeFigureOut">
               <a:rPr lang="en-US" dirty="0"/>
-              <a:t>5/27/2019</a:t>
+              <a:t>17/6/2019</a:t>
             </a:fld>
             <a:endParaRPr lang="en-US" dirty="0"/>
           </a:p>
@@ -6146,7 +6171,7 @@
           <a:p>
             <a:fld id="{48A87A34-81AB-432B-8DAE-1953F412C126}" type="datetimeFigureOut">
               <a:rPr lang="en-US" dirty="0"/>
-              <a:t>5/27/2019</a:t>
+              <a:t>17/6/2019</a:t>
             </a:fld>
             <a:endParaRPr lang="en-US" dirty="0"/>
           </a:p>
@@ -6295,7 +6320,7 @@
           <a:p>
             <a:fld id="{48A87A34-81AB-432B-8DAE-1953F412C126}" type="datetimeFigureOut">
               <a:rPr lang="en-US" dirty="0"/>
-              <a:t>5/27/2019</a:t>
+              <a:t>17/6/2019</a:t>
             </a:fld>
             <a:endParaRPr lang="en-US" dirty="0"/>
           </a:p>
@@ -6421,7 +6446,7 @@
           <a:p>
             <a:fld id="{48A87A34-81AB-432B-8DAE-1953F412C126}" type="datetimeFigureOut">
               <a:rPr lang="en-US" dirty="0"/>
-              <a:t>5/27/2019</a:t>
+              <a:t>17/6/2019</a:t>
             </a:fld>
             <a:endParaRPr lang="en-US" dirty="0"/>
           </a:p>
@@ -6672,7 +6697,7 @@
           <a:p>
             <a:fld id="{48A87A34-81AB-432B-8DAE-1953F412C126}" type="datetimeFigureOut">
               <a:rPr lang="en-US" dirty="0"/>
-              <a:t>5/27/2019</a:t>
+              <a:t>17/6/2019</a:t>
             </a:fld>
             <a:endParaRPr lang="en-US" dirty="0"/>
           </a:p>
@@ -7118,7 +7143,7 @@
             <a:fld id="{48A87A34-81AB-432B-8DAE-1953F412C126}" type="datetimeFigureOut">
               <a:rPr lang="en-US" dirty="0"/>
               <a:pPr/>
-              <a:t>5/27/2019</a:t>
+              <a:t>17/6/2019</a:t>
             </a:fld>
             <a:endParaRPr lang="en-US" dirty="0"/>
           </a:p>
@@ -7446,7 +7471,7 @@
             <a:fld id="{48A87A34-81AB-432B-8DAE-1953F412C126}" type="datetimeFigureOut">
               <a:rPr lang="en-US" dirty="0"/>
               <a:pPr/>
-              <a:t>5/27/2019</a:t>
+              <a:t>17/6/2019</a:t>
             </a:fld>
             <a:endParaRPr lang="en-US" dirty="0"/>
           </a:p>
@@ -8235,8 +8260,8 @@
         </p:blipFill>
         <p:spPr>
           <a:xfrm>
-            <a:off x="145083" y="145450"/>
-            <a:ext cx="1299404" cy="1285784"/>
+            <a:off x="463827" y="0"/>
+            <a:ext cx="1683026" cy="1683026"/>
           </a:xfrm>
           <a:prstGeom prst="rect">
             <a:avLst/>
@@ -8300,8 +8325,8 @@
         </p:nvSpPr>
         <p:spPr>
           <a:xfrm>
-            <a:off x="1641854" y="3932045"/>
-            <a:ext cx="9647584" cy="1938992"/>
+            <a:off x="1510747" y="4090297"/>
+            <a:ext cx="9647584" cy="1200329"/>
           </a:xfrm>
           <a:prstGeom prst="rect">
             <a:avLst/>
@@ -8405,137 +8430,7 @@
                 <a:latin typeface="Times New Roman" panose="02020603050405020304" pitchFamily="18" charset="0"/>
                 <a:cs typeface="Times New Roman" panose="02020603050405020304" pitchFamily="18" charset="0"/>
               </a:rPr>
-              <a:t> 15: </a:t>
-            </a:r>
-            <a:r>
-              <a:rPr lang="en-US" sz="2400" dirty="0" err="1">
-                <a:latin typeface="Times New Roman" panose="02020603050405020304" pitchFamily="18" charset="0"/>
-                <a:cs typeface="Times New Roman" panose="02020603050405020304" pitchFamily="18" charset="0"/>
-              </a:rPr>
-              <a:t>Trần</a:t>
-            </a:r>
-            <a:r>
-              <a:rPr lang="en-US" sz="2400" dirty="0">
-                <a:latin typeface="Times New Roman" panose="02020603050405020304" pitchFamily="18" charset="0"/>
-                <a:cs typeface="Times New Roman" panose="02020603050405020304" pitchFamily="18" charset="0"/>
-              </a:rPr>
-              <a:t> </a:t>
-            </a:r>
-            <a:r>
-              <a:rPr lang="en-US" sz="2400" dirty="0" err="1">
-                <a:latin typeface="Times New Roman" panose="02020603050405020304" pitchFamily="18" charset="0"/>
-                <a:cs typeface="Times New Roman" panose="02020603050405020304" pitchFamily="18" charset="0"/>
-              </a:rPr>
-              <a:t>Văn</a:t>
-            </a:r>
-            <a:r>
-              <a:rPr lang="en-US" sz="2400" dirty="0">
-                <a:latin typeface="Times New Roman" panose="02020603050405020304" pitchFamily="18" charset="0"/>
-                <a:cs typeface="Times New Roman" panose="02020603050405020304" pitchFamily="18" charset="0"/>
-              </a:rPr>
-              <a:t> Thanh- 55K2- 145D4802010076</a:t>
-            </a:r>
-          </a:p>
-          <a:p>
-            <a:r>
-              <a:rPr lang="en-US" sz="2400" dirty="0">
-                <a:latin typeface="Times New Roman" panose="02020603050405020304" pitchFamily="18" charset="0"/>
-                <a:cs typeface="Times New Roman" panose="02020603050405020304" pitchFamily="18" charset="0"/>
-              </a:rPr>
-              <a:t>                 </a:t>
-            </a:r>
-            <a:r>
-              <a:rPr lang="en-US" sz="2400" dirty="0" err="1">
-                <a:latin typeface="Times New Roman" panose="02020603050405020304" pitchFamily="18" charset="0"/>
-                <a:cs typeface="Times New Roman" panose="02020603050405020304" pitchFamily="18" charset="0"/>
-              </a:rPr>
-              <a:t>Ngô</a:t>
-            </a:r>
-            <a:r>
-              <a:rPr lang="en-US" sz="2400" dirty="0">
-                <a:latin typeface="Times New Roman" panose="02020603050405020304" pitchFamily="18" charset="0"/>
-                <a:cs typeface="Times New Roman" panose="02020603050405020304" pitchFamily="18" charset="0"/>
-              </a:rPr>
-              <a:t> </a:t>
-            </a:r>
-            <a:r>
-              <a:rPr lang="en-US" sz="2400" dirty="0" err="1">
-                <a:latin typeface="Times New Roman" panose="02020603050405020304" pitchFamily="18" charset="0"/>
-                <a:cs typeface="Times New Roman" panose="02020603050405020304" pitchFamily="18" charset="0"/>
-              </a:rPr>
-              <a:t>Đức</a:t>
-            </a:r>
-            <a:r>
-              <a:rPr lang="en-US" sz="2400" dirty="0">
-                <a:latin typeface="Times New Roman" panose="02020603050405020304" pitchFamily="18" charset="0"/>
-                <a:cs typeface="Times New Roman" panose="02020603050405020304" pitchFamily="18" charset="0"/>
-              </a:rPr>
-              <a:t> </a:t>
-            </a:r>
-            <a:r>
-              <a:rPr lang="en-US" sz="2400" dirty="0" err="1">
-                <a:latin typeface="Times New Roman" panose="02020603050405020304" pitchFamily="18" charset="0"/>
-                <a:cs typeface="Times New Roman" panose="02020603050405020304" pitchFamily="18" charset="0"/>
-              </a:rPr>
-              <a:t>Thế</a:t>
-            </a:r>
-            <a:r>
-              <a:rPr lang="en-US" sz="2400" dirty="0">
-                <a:latin typeface="Times New Roman" panose="02020603050405020304" pitchFamily="18" charset="0"/>
-                <a:cs typeface="Times New Roman" panose="02020603050405020304" pitchFamily="18" charset="0"/>
-              </a:rPr>
-              <a:t>- 55K2- 145D4802010049</a:t>
-            </a:r>
-          </a:p>
-          <a:p>
-            <a:r>
-              <a:rPr lang="en-US" sz="2400" dirty="0">
-                <a:latin typeface="Times New Roman" panose="02020603050405020304" pitchFamily="18" charset="0"/>
-                <a:cs typeface="Times New Roman" panose="02020603050405020304" pitchFamily="18" charset="0"/>
-              </a:rPr>
-              <a:t>                 </a:t>
-            </a:r>
-            <a:r>
-              <a:rPr lang="en-US" sz="2400" dirty="0" err="1">
-                <a:latin typeface="Times New Roman" panose="02020603050405020304" pitchFamily="18" charset="0"/>
-                <a:cs typeface="Times New Roman" panose="02020603050405020304" pitchFamily="18" charset="0"/>
-              </a:rPr>
-              <a:t>Trần</a:t>
-            </a:r>
-            <a:r>
-              <a:rPr lang="en-US" sz="2400" dirty="0">
-                <a:latin typeface="Times New Roman" panose="02020603050405020304" pitchFamily="18" charset="0"/>
-                <a:cs typeface="Times New Roman" panose="02020603050405020304" pitchFamily="18" charset="0"/>
-              </a:rPr>
-              <a:t> </a:t>
-            </a:r>
-            <a:r>
-              <a:rPr lang="en-US" sz="2400" dirty="0" err="1">
-                <a:latin typeface="Times New Roman" panose="02020603050405020304" pitchFamily="18" charset="0"/>
-                <a:cs typeface="Times New Roman" panose="02020603050405020304" pitchFamily="18" charset="0"/>
-              </a:rPr>
-              <a:t>Bá</a:t>
-            </a:r>
-            <a:r>
-              <a:rPr lang="en-US" sz="2400" dirty="0">
-                <a:latin typeface="Times New Roman" panose="02020603050405020304" pitchFamily="18" charset="0"/>
-                <a:cs typeface="Times New Roman" panose="02020603050405020304" pitchFamily="18" charset="0"/>
-              </a:rPr>
-              <a:t> </a:t>
-            </a:r>
-            <a:r>
-              <a:rPr lang="en-US" sz="2400" dirty="0" err="1">
-                <a:latin typeface="Times New Roman" panose="02020603050405020304" pitchFamily="18" charset="0"/>
-                <a:cs typeface="Times New Roman" panose="02020603050405020304" pitchFamily="18" charset="0"/>
-              </a:rPr>
-              <a:t>Thắng</a:t>
-            </a:r>
-            <a:r>
-              <a:rPr lang="en-US" sz="2400" dirty="0">
-                <a:latin typeface="Times New Roman" panose="02020603050405020304" pitchFamily="18" charset="0"/>
-                <a:cs typeface="Times New Roman" panose="02020603050405020304" pitchFamily="18" charset="0"/>
-              </a:rPr>
-              <a:t>- 55K2- 145D4802010052</a:t>
+              <a:t>: 15 </a:t>
             </a:r>
           </a:p>
           <a:p>
@@ -9093,7 +8988,7 @@
                 <a:latin typeface="Times New Roman" panose="02020603050405020304" pitchFamily="18" charset="0"/>
                 <a:cs typeface="Times New Roman" panose="02020603050405020304" pitchFamily="18" charset="0"/>
               </a:rPr>
-              <a:t>sử</a:t>
+              <a:t>tiêu</a:t>
             </a:r>
             <a:r>
               <a:rPr lang="en-US" sz="2400" dirty="0">
@@ -9107,7 +9002,7 @@
                 <a:latin typeface="Times New Roman" panose="02020603050405020304" pitchFamily="18" charset="0"/>
                 <a:cs typeface="Times New Roman" panose="02020603050405020304" pitchFamily="18" charset="0"/>
               </a:rPr>
-              <a:t>dụng</a:t>
+              <a:t>dùng</a:t>
             </a:r>
             <a:r>
               <a:rPr lang="en-US" sz="2400" dirty="0">
@@ -9717,8 +9612,8 @@
         </p:nvSpPr>
         <p:spPr>
           <a:xfrm>
-            <a:off x="1722782" y="2345635"/>
-            <a:ext cx="8746435" cy="769441"/>
+            <a:off x="1449977" y="2345635"/>
+            <a:ext cx="9431383" cy="769441"/>
           </a:xfrm>
           <a:prstGeom prst="rect">
             <a:avLst/>
@@ -9789,7 +9684,7 @@
               <a:t>n </a:t>
             </a:r>
             <a:r>
-              <a:rPr lang="en-US" sz="4400" dirty="0" err="1">
+              <a:rPr lang="en-US" sz="4400" dirty="0" smtClean="0">
                 <a:effectLst>
                   <a:outerShdw blurRad="38100" dist="38100" dir="2700000" algn="tl">
                     <a:srgbClr val="000000">
@@ -9800,7 +9695,7 @@
                 <a:latin typeface="Times New Roman" panose="02020603050405020304" pitchFamily="18" charset="0"/>
                 <a:cs typeface="Times New Roman" panose="02020603050405020304" pitchFamily="18" charset="0"/>
               </a:rPr>
-              <a:t>thầy</a:t>
+              <a:t>thầy cô </a:t>
             </a:r>
             <a:r>
               <a:rPr lang="en-US" sz="4400" dirty="0">
@@ -9814,175 +9709,7 @@
                 <a:latin typeface="Times New Roman" panose="02020603050405020304" pitchFamily="18" charset="0"/>
                 <a:cs typeface="Times New Roman" panose="02020603050405020304" pitchFamily="18" charset="0"/>
               </a:rPr>
-              <a:t> </a:t>
-            </a:r>
-            <a:r>
-              <a:rPr lang="en-US" sz="4400" dirty="0" err="1">
-                <a:effectLst>
-                  <a:outerShdw blurRad="38100" dist="38100" dir="2700000" algn="tl">
-                    <a:srgbClr val="000000">
-                      <a:alpha val="43137"/>
-                    </a:srgbClr>
-                  </a:outerShdw>
-                </a:effectLst>
-                <a:latin typeface="Times New Roman" panose="02020603050405020304" pitchFamily="18" charset="0"/>
-                <a:cs typeface="Times New Roman" panose="02020603050405020304" pitchFamily="18" charset="0"/>
-              </a:rPr>
-              <a:t>và</a:t>
-            </a:r>
-            <a:r>
-              <a:rPr lang="en-US" sz="4400" dirty="0">
-                <a:effectLst>
-                  <a:outerShdw blurRad="38100" dist="38100" dir="2700000" algn="tl">
-                    <a:srgbClr val="000000">
-                      <a:alpha val="43137"/>
-                    </a:srgbClr>
-                  </a:outerShdw>
-                </a:effectLst>
-                <a:latin typeface="Times New Roman" panose="02020603050405020304" pitchFamily="18" charset="0"/>
-                <a:cs typeface="Times New Roman" panose="02020603050405020304" pitchFamily="18" charset="0"/>
-              </a:rPr>
-              <a:t> </a:t>
-            </a:r>
-            <a:r>
-              <a:rPr lang="en-US" sz="4400" dirty="0" err="1">
-                <a:effectLst>
-                  <a:outerShdw blurRad="38100" dist="38100" dir="2700000" algn="tl">
-                    <a:srgbClr val="000000">
-                      <a:alpha val="43137"/>
-                    </a:srgbClr>
-                  </a:outerShdw>
-                </a:effectLst>
-                <a:latin typeface="Times New Roman" panose="02020603050405020304" pitchFamily="18" charset="0"/>
-                <a:cs typeface="Times New Roman" panose="02020603050405020304" pitchFamily="18" charset="0"/>
-              </a:rPr>
-              <a:t>các</a:t>
-            </a:r>
-            <a:r>
-              <a:rPr lang="en-US" sz="4400" dirty="0">
-                <a:effectLst>
-                  <a:outerShdw blurRad="38100" dist="38100" dir="2700000" algn="tl">
-                    <a:srgbClr val="000000">
-                      <a:alpha val="43137"/>
-                    </a:srgbClr>
-                  </a:outerShdw>
-                </a:effectLst>
-                <a:latin typeface="Times New Roman" panose="02020603050405020304" pitchFamily="18" charset="0"/>
-                <a:cs typeface="Times New Roman" panose="02020603050405020304" pitchFamily="18" charset="0"/>
-              </a:rPr>
-              <a:t> </a:t>
-            </a:r>
-            <a:r>
-              <a:rPr lang="en-US" sz="4400" dirty="0" err="1">
-                <a:effectLst>
-                  <a:outerShdw blurRad="38100" dist="38100" dir="2700000" algn="tl">
-                    <a:srgbClr val="000000">
-                      <a:alpha val="43137"/>
-                    </a:srgbClr>
-                  </a:outerShdw>
-                </a:effectLst>
-                <a:latin typeface="Times New Roman" panose="02020603050405020304" pitchFamily="18" charset="0"/>
-                <a:cs typeface="Times New Roman" panose="02020603050405020304" pitchFamily="18" charset="0"/>
-              </a:rPr>
-              <a:t>bạn</a:t>
-            </a:r>
-            <a:r>
-              <a:rPr lang="en-US" sz="4400" dirty="0">
-                <a:effectLst>
-                  <a:outerShdw blurRad="38100" dist="38100" dir="2700000" algn="tl">
-                    <a:srgbClr val="000000">
-                      <a:alpha val="43137"/>
-                    </a:srgbClr>
-                  </a:outerShdw>
-                </a:effectLst>
-                <a:latin typeface="Times New Roman" panose="02020603050405020304" pitchFamily="18" charset="0"/>
-                <a:cs typeface="Times New Roman" panose="02020603050405020304" pitchFamily="18" charset="0"/>
-              </a:rPr>
-              <a:t> </a:t>
-            </a:r>
-            <a:r>
-              <a:rPr lang="en-US" sz="4400" dirty="0" err="1">
-                <a:effectLst>
-                  <a:outerShdw blurRad="38100" dist="38100" dir="2700000" algn="tl">
-                    <a:srgbClr val="000000">
-                      <a:alpha val="43137"/>
-                    </a:srgbClr>
-                  </a:outerShdw>
-                </a:effectLst>
-                <a:latin typeface="Times New Roman" panose="02020603050405020304" pitchFamily="18" charset="0"/>
-                <a:cs typeface="Times New Roman" panose="02020603050405020304" pitchFamily="18" charset="0"/>
-              </a:rPr>
-              <a:t>đã</a:t>
-            </a:r>
-            <a:r>
-              <a:rPr lang="en-US" sz="4400" dirty="0">
-                <a:effectLst>
-                  <a:outerShdw blurRad="38100" dist="38100" dir="2700000" algn="tl">
-                    <a:srgbClr val="000000">
-                      <a:alpha val="43137"/>
-                    </a:srgbClr>
-                  </a:outerShdw>
-                </a:effectLst>
-                <a:latin typeface="Times New Roman" panose="02020603050405020304" pitchFamily="18" charset="0"/>
-                <a:cs typeface="Times New Roman" panose="02020603050405020304" pitchFamily="18" charset="0"/>
-              </a:rPr>
-              <a:t> </a:t>
-            </a:r>
-            <a:r>
-              <a:rPr lang="en-US" sz="4400" dirty="0" err="1">
-                <a:effectLst>
-                  <a:outerShdw blurRad="38100" dist="38100" dir="2700000" algn="tl">
-                    <a:srgbClr val="000000">
-                      <a:alpha val="43137"/>
-                    </a:srgbClr>
-                  </a:outerShdw>
-                </a:effectLst>
-                <a:latin typeface="Times New Roman" panose="02020603050405020304" pitchFamily="18" charset="0"/>
-                <a:cs typeface="Times New Roman" panose="02020603050405020304" pitchFamily="18" charset="0"/>
-              </a:rPr>
-              <a:t>lắng</a:t>
-            </a:r>
-            <a:r>
-              <a:rPr lang="en-US" sz="4400" dirty="0">
-                <a:effectLst>
-                  <a:outerShdw blurRad="38100" dist="38100" dir="2700000" algn="tl">
-                    <a:srgbClr val="000000">
-                      <a:alpha val="43137"/>
-                    </a:srgbClr>
-                  </a:outerShdw>
-                </a:effectLst>
-                <a:latin typeface="Times New Roman" panose="02020603050405020304" pitchFamily="18" charset="0"/>
-                <a:cs typeface="Times New Roman" panose="02020603050405020304" pitchFamily="18" charset="0"/>
-              </a:rPr>
-              <a:t> </a:t>
-            </a:r>
-            <a:r>
-              <a:rPr lang="en-US" sz="4400" dirty="0" err="1">
-                <a:effectLst>
-                  <a:outerShdw blurRad="38100" dist="38100" dir="2700000" algn="tl">
-                    <a:srgbClr val="000000">
-                      <a:alpha val="43137"/>
-                    </a:srgbClr>
-                  </a:outerShdw>
-                </a:effectLst>
-                <a:latin typeface="Times New Roman" panose="02020603050405020304" pitchFamily="18" charset="0"/>
-                <a:cs typeface="Times New Roman" panose="02020603050405020304" pitchFamily="18" charset="0"/>
-              </a:rPr>
-              <a:t>nge</a:t>
-            </a:r>
-            <a:r>
-              <a:rPr lang="en-US" sz="4400" dirty="0">
-                <a:effectLst>
-                  <a:outerShdw blurRad="38100" dist="38100" dir="2700000" algn="tl">
-                    <a:srgbClr val="000000">
-                      <a:alpha val="43137"/>
-                    </a:srgbClr>
-                  </a:outerShdw>
-                </a:effectLst>
-                <a:latin typeface="Times New Roman" panose="02020603050405020304" pitchFamily="18" charset="0"/>
-                <a:cs typeface="Times New Roman" panose="02020603050405020304" pitchFamily="18" charset="0"/>
-              </a:rPr>
-              <a:t> !</a:t>
+              <a:t>và các bạn đã lắng nge !</a:t>
             </a:r>
           </a:p>
         </p:txBody>
@@ -10215,74 +9942,14 @@
               <a:defRPr/>
             </a:pPr>
             <a:r>
-              <a:rPr lang="en-US" kern="0" noProof="0" dirty="0" err="1">
+              <a:rPr lang="en-US" kern="0" noProof="0">
                 <a:solidFill>
                   <a:prstClr val="black"/>
                 </a:solidFill>
                 <a:latin typeface="Times New Roman" panose="02020603050405020304" pitchFamily="18" charset="0"/>
                 <a:cs typeface="Times New Roman" panose="02020603050405020304" pitchFamily="18" charset="0"/>
               </a:rPr>
-              <a:t>Phân</a:t>
-            </a:r>
-            <a:r>
-              <a:rPr lang="en-US" kern="0" noProof="0" dirty="0">
-                <a:solidFill>
-                  <a:prstClr val="black"/>
-                </a:solidFill>
-                <a:latin typeface="Times New Roman" panose="02020603050405020304" pitchFamily="18" charset="0"/>
-                <a:cs typeface="Times New Roman" panose="02020603050405020304" pitchFamily="18" charset="0"/>
-              </a:rPr>
-              <a:t> </a:t>
-            </a:r>
-            <a:r>
-              <a:rPr lang="en-US" kern="0" noProof="0" dirty="0" err="1">
-                <a:solidFill>
-                  <a:prstClr val="black"/>
-                </a:solidFill>
-                <a:latin typeface="Times New Roman" panose="02020603050405020304" pitchFamily="18" charset="0"/>
-                <a:cs typeface="Times New Roman" panose="02020603050405020304" pitchFamily="18" charset="0"/>
-              </a:rPr>
-              <a:t>tích</a:t>
-            </a:r>
-            <a:r>
-              <a:rPr lang="en-US" kern="0" noProof="0" dirty="0">
-                <a:solidFill>
-                  <a:prstClr val="black"/>
-                </a:solidFill>
-                <a:latin typeface="Times New Roman" panose="02020603050405020304" pitchFamily="18" charset="0"/>
-                <a:cs typeface="Times New Roman" panose="02020603050405020304" pitchFamily="18" charset="0"/>
-              </a:rPr>
-              <a:t> </a:t>
-            </a:r>
-            <a:r>
-              <a:rPr lang="en-US" kern="0" noProof="0" dirty="0" err="1">
-                <a:solidFill>
-                  <a:prstClr val="black"/>
-                </a:solidFill>
-                <a:latin typeface="Times New Roman" panose="02020603050405020304" pitchFamily="18" charset="0"/>
-                <a:cs typeface="Times New Roman" panose="02020603050405020304" pitchFamily="18" charset="0"/>
-              </a:rPr>
-              <a:t>thiết</a:t>
-            </a:r>
-            <a:r>
-              <a:rPr lang="en-US" kern="0" noProof="0" dirty="0">
-                <a:solidFill>
-                  <a:prstClr val="black"/>
-                </a:solidFill>
-                <a:latin typeface="Times New Roman" panose="02020603050405020304" pitchFamily="18" charset="0"/>
-                <a:cs typeface="Times New Roman" panose="02020603050405020304" pitchFamily="18" charset="0"/>
-              </a:rPr>
-              <a:t> </a:t>
-            </a:r>
-            <a:r>
-              <a:rPr lang="en-US" kern="0" noProof="0" dirty="0" err="1">
-                <a:solidFill>
-                  <a:prstClr val="black"/>
-                </a:solidFill>
-                <a:latin typeface="Times New Roman" panose="02020603050405020304" pitchFamily="18" charset="0"/>
-                <a:cs typeface="Times New Roman" panose="02020603050405020304" pitchFamily="18" charset="0"/>
-              </a:rPr>
-              <a:t>kế</a:t>
+              <a:t>Phân tích thiết kế</a:t>
             </a:r>
             <a:endParaRPr kumimoji="0" lang="en-US" sz="1800" b="0" i="0" u="none" strike="noStrike" kern="0" cap="none" spc="0" normalizeH="0" baseline="0" noProof="0" dirty="0">
               <a:ln>
@@ -10752,7 +10419,7 @@
               <a:defRPr/>
             </a:pPr>
             <a:r>
-              <a:rPr kumimoji="0" lang="en-US" b="1" i="0" u="none" strike="noStrike" kern="0" cap="none" spc="0" normalizeH="0" baseline="0" noProof="0">
+              <a:rPr kumimoji="0" lang="en-US" b="1" i="0" u="none" strike="noStrike" kern="0" cap="none" spc="0" normalizeH="0" baseline="0" noProof="0" dirty="0">
                 <a:ln>
                   <a:noFill/>
                 </a:ln>
@@ -10768,7 +10435,7 @@
               <a:t>Trần</a:t>
             </a:r>
             <a:r>
-              <a:rPr kumimoji="0" lang="en-US" b="1" i="0" u="none" strike="noStrike" kern="0" cap="none" spc="0" normalizeH="0" noProof="0">
+              <a:rPr kumimoji="0" lang="en-US" b="1" i="0" u="none" strike="noStrike" kern="0" cap="none" spc="0" normalizeH="0" noProof="0" dirty="0">
                 <a:ln>
                   <a:noFill/>
                 </a:ln>
@@ -11363,34 +11030,14 @@
               <a:defRPr/>
             </a:pPr>
             <a:r>
-              <a:rPr lang="en-US" kern="0" noProof="0" dirty="0">
+              <a:rPr lang="en-US" kern="0" noProof="0">
                 <a:solidFill>
                   <a:prstClr val="black"/>
                 </a:solidFill>
                 <a:latin typeface="Times New Roman" panose="02020603050405020304" pitchFamily="18" charset="0"/>
                 <a:cs typeface="Times New Roman" panose="02020603050405020304" pitchFamily="18" charset="0"/>
               </a:rPr>
-              <a:t>Coding(</a:t>
-            </a:r>
-            <a:r>
-              <a:rPr lang="en-US" kern="0" noProof="0" dirty="0" err="1">
-                <a:solidFill>
-                  <a:prstClr val="black"/>
-                </a:solidFill>
-                <a:latin typeface="Times New Roman" panose="02020603050405020304" pitchFamily="18" charset="0"/>
-                <a:cs typeface="Times New Roman" panose="02020603050405020304" pitchFamily="18" charset="0"/>
-              </a:rPr>
-              <a:t>csdl</a:t>
-            </a:r>
-            <a:r>
-              <a:rPr lang="en-US" kern="0" noProof="0" dirty="0">
-                <a:solidFill>
-                  <a:prstClr val="black"/>
-                </a:solidFill>
-                <a:latin typeface="Times New Roman" panose="02020603050405020304" pitchFamily="18" charset="0"/>
-                <a:cs typeface="Times New Roman" panose="02020603050405020304" pitchFamily="18" charset="0"/>
-              </a:rPr>
-              <a:t>)	</a:t>
+              <a:t>Coding(csdl)	</a:t>
             </a:r>
             <a:endParaRPr kumimoji="0" lang="en-US" sz="1800" b="0" i="0" u="none" strike="noStrike" kern="0" cap="none" spc="0" normalizeH="0" baseline="0" noProof="0" dirty="0">
               <a:ln>
@@ -11700,7 +11347,7 @@
               <a:defRPr/>
             </a:pPr>
             <a:r>
-              <a:rPr kumimoji="0" lang="en-US" b="1" i="0" u="none" strike="noStrike" kern="0" cap="none" spc="0" normalizeH="0" baseline="0" noProof="0">
+              <a:rPr kumimoji="0" lang="en-US" b="1" i="0" u="none" strike="noStrike" kern="0" cap="none" spc="0" normalizeH="0" baseline="0" noProof="0" dirty="0">
                 <a:ln>
                   <a:noFill/>
                 </a:ln>
@@ -11716,7 +11363,7 @@
               <a:t>Trần</a:t>
             </a:r>
             <a:r>
-              <a:rPr kumimoji="0" lang="en-US" b="1" i="0" u="none" strike="noStrike" kern="0" cap="none" spc="0" normalizeH="0" noProof="0">
+              <a:rPr kumimoji="0" lang="en-US" b="1" i="0" u="none" strike="noStrike" kern="0" cap="none" spc="0" normalizeH="0" noProof="0" dirty="0">
                 <a:ln>
                   <a:noFill/>
                 </a:ln>
@@ -12079,7 +11726,7 @@
               <a:defRPr/>
             </a:pPr>
             <a:r>
-              <a:rPr kumimoji="0" lang="en-US" sz="1800" b="0" i="0" u="none" strike="noStrike" kern="0" cap="none" spc="0" normalizeH="0" baseline="0" noProof="0" dirty="0">
+              <a:rPr kumimoji="0" lang="en-US" sz="1800" b="0" i="0" u="none" strike="noStrike" kern="0" cap="none" spc="0" normalizeH="0" baseline="0" noProof="0">
                 <a:ln>
                   <a:noFill/>
                 </a:ln>
@@ -12092,10 +11739,10 @@
                 <a:latin typeface="Times New Roman" panose="02020603050405020304" pitchFamily="18" charset="0"/>
                 <a:cs typeface="Times New Roman" panose="02020603050405020304" pitchFamily="18" charset="0"/>
               </a:rPr>
-              <a:t>Thu </a:t>
-            </a:r>
-            <a:r>
-              <a:rPr kumimoji="0" lang="en-US" sz="1800" b="0" i="0" u="none" strike="noStrike" kern="0" cap="none" spc="0" normalizeH="0" baseline="0" noProof="0" dirty="0" err="1">
+              <a:t>Thu thập</a:t>
+            </a:r>
+            <a:r>
+              <a:rPr kumimoji="0" lang="en-US" sz="1800" b="0" i="0" u="none" strike="noStrike" kern="0" cap="none" spc="0" normalizeH="0" noProof="0">
                 <a:ln>
                   <a:noFill/>
                 </a:ln>
@@ -12108,71 +11755,7 @@
                 <a:latin typeface="Times New Roman" panose="02020603050405020304" pitchFamily="18" charset="0"/>
                 <a:cs typeface="Times New Roman" panose="02020603050405020304" pitchFamily="18" charset="0"/>
               </a:rPr>
-              <a:t>thập</a:t>
-            </a:r>
-            <a:r>
-              <a:rPr kumimoji="0" lang="en-US" sz="1800" b="0" i="0" u="none" strike="noStrike" kern="0" cap="none" spc="0" normalizeH="0" noProof="0" dirty="0">
-                <a:ln>
-                  <a:noFill/>
-                </a:ln>
-                <a:solidFill>
-                  <a:prstClr val="black"/>
-                </a:solidFill>
-                <a:effectLst/>
-                <a:uLnTx/>
-                <a:uFillTx/>
-                <a:latin typeface="Times New Roman" panose="02020603050405020304" pitchFamily="18" charset="0"/>
-                <a:cs typeface="Times New Roman" panose="02020603050405020304" pitchFamily="18" charset="0"/>
-              </a:rPr>
-              <a:t> </a:t>
-            </a:r>
-            <a:r>
-              <a:rPr kumimoji="0" lang="en-US" sz="1800" b="0" i="0" u="none" strike="noStrike" kern="0" cap="none" spc="0" normalizeH="0" noProof="0" dirty="0" err="1">
-                <a:ln>
-                  <a:noFill/>
-                </a:ln>
-                <a:solidFill>
-                  <a:prstClr val="black"/>
-                </a:solidFill>
-                <a:effectLst/>
-                <a:uLnTx/>
-                <a:uFillTx/>
-                <a:latin typeface="Times New Roman" panose="02020603050405020304" pitchFamily="18" charset="0"/>
-                <a:cs typeface="Times New Roman" panose="02020603050405020304" pitchFamily="18" charset="0"/>
-              </a:rPr>
-              <a:t>yêu</a:t>
-            </a:r>
-            <a:r>
-              <a:rPr kumimoji="0" lang="en-US" sz="1800" b="0" i="0" u="none" strike="noStrike" kern="0" cap="none" spc="0" normalizeH="0" noProof="0" dirty="0">
-                <a:ln>
-                  <a:noFill/>
-                </a:ln>
-                <a:solidFill>
-                  <a:prstClr val="black"/>
-                </a:solidFill>
-                <a:effectLst/>
-                <a:uLnTx/>
-                <a:uFillTx/>
-                <a:latin typeface="Times New Roman" panose="02020603050405020304" pitchFamily="18" charset="0"/>
-                <a:cs typeface="Times New Roman" panose="02020603050405020304" pitchFamily="18" charset="0"/>
-              </a:rPr>
-              <a:t> </a:t>
-            </a:r>
-            <a:r>
-              <a:rPr kumimoji="0" lang="en-US" sz="1800" b="0" i="0" u="none" strike="noStrike" kern="0" cap="none" spc="0" normalizeH="0" noProof="0" dirty="0" err="1">
-                <a:ln>
-                  <a:noFill/>
-                </a:ln>
-                <a:solidFill>
-                  <a:prstClr val="black"/>
-                </a:solidFill>
-                <a:effectLst/>
-                <a:uLnTx/>
-                <a:uFillTx/>
-                <a:latin typeface="Times New Roman" panose="02020603050405020304" pitchFamily="18" charset="0"/>
-                <a:cs typeface="Times New Roman" panose="02020603050405020304" pitchFamily="18" charset="0"/>
-              </a:rPr>
-              <a:t>cầu</a:t>
+              <a:t> yêu cầu</a:t>
             </a:r>
             <a:endParaRPr kumimoji="0" lang="en-US" sz="1800" b="0" i="0" u="none" strike="noStrike" kern="0" cap="none" spc="0" normalizeH="0" baseline="0" noProof="0" dirty="0">
               <a:ln>
@@ -12255,7 +11838,7 @@
               <a:defRPr/>
             </a:pPr>
             <a:r>
-              <a:rPr lang="en-US" kern="0" dirty="0">
+              <a:rPr lang="en-US" kern="0">
                 <a:solidFill>
                   <a:prstClr val="black"/>
                 </a:solidFill>
@@ -12662,7 +12245,7 @@
               <a:defRPr/>
             </a:pPr>
             <a:r>
-              <a:rPr kumimoji="0" lang="en-US" b="1" i="0" u="none" strike="noStrike" kern="0" cap="none" spc="0" normalizeH="0" baseline="0" noProof="0">
+              <a:rPr kumimoji="0" lang="en-US" b="1" i="0" u="none" strike="noStrike" kern="0" cap="none" spc="0" normalizeH="0" baseline="0" noProof="0" dirty="0">
                 <a:ln>
                   <a:noFill/>
                 </a:ln>
@@ -12678,7 +12261,7 @@
               <a:t>Ngô</a:t>
             </a:r>
             <a:r>
-              <a:rPr kumimoji="0" lang="en-US" b="1" i="0" u="none" strike="noStrike" kern="0" cap="none" spc="0" normalizeH="0" noProof="0">
+              <a:rPr kumimoji="0" lang="en-US" b="1" i="0" u="none" strike="noStrike" kern="0" cap="none" spc="0" normalizeH="0" noProof="0" dirty="0">
                 <a:ln>
                   <a:noFill/>
                 </a:ln>

</xml_diff>